<commit_message>
Update logic class diagram
</commit_message>
<xml_diff>
--- a/docs/Diagrams.pptx
+++ b/docs/Diagrams.pptx
@@ -7005,7 +7005,7 @@
         </p:nvSpPr>
         <p:spPr>
           <a:xfrm>
-            <a:off x="3124200" y="2667000"/>
+            <a:off x="2971800" y="2667000"/>
             <a:ext cx="1219200" cy="346760"/>
           </a:xfrm>
           <a:prstGeom prst="rect">
@@ -7058,7 +7058,7 @@
         <p:spPr>
           <a:xfrm flipV="1">
             <a:off x="2549587" y="2840380"/>
-            <a:ext cx="574613" cy="4831"/>
+            <a:ext cx="422213" cy="4831"/>
           </a:xfrm>
           <a:prstGeom prst="bentConnector3">
             <a:avLst>
@@ -7101,13 +7101,14 @@
           </p:cNvPr>
           <p:cNvCxnSpPr>
             <a:cxnSpLocks/>
+            <a:stCxn id="18" idx="3"/>
           </p:cNvCxnSpPr>
           <p:nvPr/>
         </p:nvCxnSpPr>
         <p:spPr>
-          <a:xfrm flipV="1">
-            <a:off x="4352260" y="2845211"/>
-            <a:ext cx="287308" cy="1"/>
+          <a:xfrm>
+            <a:off x="4478308" y="2833728"/>
+            <a:ext cx="161260" cy="11484"/>
           </a:xfrm>
           <a:prstGeom prst="bentConnector3">
             <a:avLst>
@@ -7611,15 +7612,15 @@
           </p:cNvPr>
           <p:cNvCxnSpPr>
             <a:cxnSpLocks/>
-            <a:stCxn id="94" idx="3"/>
+            <a:stCxn id="21" idx="3"/>
             <a:endCxn id="119" idx="1"/>
           </p:cNvCxnSpPr>
           <p:nvPr/>
         </p:nvCxnSpPr>
         <p:spPr>
           <a:xfrm>
-            <a:off x="6400800" y="1928525"/>
-            <a:ext cx="609600" cy="184095"/>
+            <a:off x="6688108" y="1939240"/>
+            <a:ext cx="322292" cy="173380"/>
           </a:xfrm>
           <a:prstGeom prst="bentConnector3">
             <a:avLst>
@@ -7702,6 +7703,108 @@
           </a:fontRef>
         </p:style>
       </p:cxnSp>
+      <p:sp>
+        <p:nvSpPr>
+          <p:cNvPr id="18" name="Flowchart: Decision 105">
+            <a:extLst>
+              <a:ext uri="{FF2B5EF4-FFF2-40B4-BE49-F238E27FC236}">
+                <a16:creationId xmlns:a16="http://schemas.microsoft.com/office/drawing/2014/main" id="{C35DD549-19A0-EB48-AACD-DFE0E507DB79}"/>
+              </a:ext>
+            </a:extLst>
+          </p:cNvPr>
+          <p:cNvSpPr/>
+          <p:nvPr/>
+        </p:nvSpPr>
+        <p:spPr>
+          <a:xfrm>
+            <a:off x="4191000" y="2728212"/>
+            <a:ext cx="287308" cy="211031"/>
+          </a:xfrm>
+          <a:prstGeom prst="flowChartDecision">
+            <a:avLst/>
+          </a:prstGeom>
+          <a:solidFill>
+            <a:srgbClr val="00B050"/>
+          </a:solidFill>
+          <a:ln w="19050">
+            <a:noFill/>
+          </a:ln>
+          <a:effectLst/>
+        </p:spPr>
+        <p:style>
+          <a:lnRef idx="1">
+            <a:schemeClr val="accent6"/>
+          </a:lnRef>
+          <a:fillRef idx="2">
+            <a:schemeClr val="accent6"/>
+          </a:fillRef>
+          <a:effectRef idx="1">
+            <a:schemeClr val="accent6"/>
+          </a:effectRef>
+          <a:fontRef idx="minor">
+            <a:schemeClr val="dk1"/>
+          </a:fontRef>
+        </p:style>
+        <p:txBody>
+          <a:bodyPr rtlCol="0" anchor="ctr"/>
+          <a:lstStyle/>
+          <a:p>
+            <a:pPr algn="ctr"/>
+            <a:endParaRPr lang="en-US" sz="1050" dirty="0"/>
+          </a:p>
+        </p:txBody>
+      </p:sp>
+      <p:sp>
+        <p:nvSpPr>
+          <p:cNvPr id="21" name="Flowchart: Decision 105">
+            <a:extLst>
+              <a:ext uri="{FF2B5EF4-FFF2-40B4-BE49-F238E27FC236}">
+                <a16:creationId xmlns:a16="http://schemas.microsoft.com/office/drawing/2014/main" id="{2154971C-476F-934C-ADF5-8296CCB16984}"/>
+              </a:ext>
+            </a:extLst>
+          </p:cNvPr>
+          <p:cNvSpPr/>
+          <p:nvPr/>
+        </p:nvSpPr>
+        <p:spPr>
+          <a:xfrm>
+            <a:off x="6400800" y="1833724"/>
+            <a:ext cx="287308" cy="211031"/>
+          </a:xfrm>
+          <a:prstGeom prst="flowChartDecision">
+            <a:avLst/>
+          </a:prstGeom>
+          <a:solidFill>
+            <a:srgbClr val="00B050"/>
+          </a:solidFill>
+          <a:ln w="19050">
+            <a:noFill/>
+          </a:ln>
+          <a:effectLst/>
+        </p:spPr>
+        <p:style>
+          <a:lnRef idx="1">
+            <a:schemeClr val="accent6"/>
+          </a:lnRef>
+          <a:fillRef idx="2">
+            <a:schemeClr val="accent6"/>
+          </a:fillRef>
+          <a:effectRef idx="1">
+            <a:schemeClr val="accent6"/>
+          </a:effectRef>
+          <a:fontRef idx="minor">
+            <a:schemeClr val="dk1"/>
+          </a:fontRef>
+        </p:style>
+        <p:txBody>
+          <a:bodyPr rtlCol="0" anchor="ctr"/>
+          <a:lstStyle/>
+          <a:p>
+            <a:pPr algn="ctr"/>
+            <a:endParaRPr lang="en-US" sz="1050" dirty="0"/>
+          </a:p>
+        </p:txBody>
+      </p:sp>
     </p:spTree>
     <p:extLst>
       <p:ext uri="{BB962C8B-B14F-4D97-AF65-F5344CB8AC3E}">

</xml_diff>